<commit_message>
updated progress image (beep2)
</commit_message>
<xml_diff>
--- a/image_edit.pptx
+++ b/image_edit.pptx
@@ -104,6 +104,11 @@
       </a:defRPr>
     </a:lvl9pPr>
   </p:defaultTextStyle>
+  <p:extLst>
+    <p:ext uri="{EFAFB233-063F-42B5-8137-9DF3F51BA10A}">
+      <p15:sldGuideLst xmlns:p15="http://schemas.microsoft.com/office/powerpoint/2012/main"/>
+    </p:ext>
+  </p:extLst>
 </p:presentation>
 </file>
 
@@ -256,7 +261,7 @@
           <a:p>
             <a:fld id="{ADA4F6E2-7C3C-4484-A16E-EF9C7DEC5D55}" type="datetimeFigureOut">
               <a:rPr lang="en-GB" smtClean="0"/>
-              <a:t>07/08/2024</a:t>
+              <a:t>24/10/2024</a:t>
             </a:fld>
             <a:endParaRPr lang="en-GB"/>
           </a:p>
@@ -456,7 +461,7 @@
           <a:p>
             <a:fld id="{ADA4F6E2-7C3C-4484-A16E-EF9C7DEC5D55}" type="datetimeFigureOut">
               <a:rPr lang="en-GB" smtClean="0"/>
-              <a:t>07/08/2024</a:t>
+              <a:t>24/10/2024</a:t>
             </a:fld>
             <a:endParaRPr lang="en-GB"/>
           </a:p>
@@ -666,7 +671,7 @@
           <a:p>
             <a:fld id="{ADA4F6E2-7C3C-4484-A16E-EF9C7DEC5D55}" type="datetimeFigureOut">
               <a:rPr lang="en-GB" smtClean="0"/>
-              <a:t>07/08/2024</a:t>
+              <a:t>24/10/2024</a:t>
             </a:fld>
             <a:endParaRPr lang="en-GB"/>
           </a:p>
@@ -866,7 +871,7 @@
           <a:p>
             <a:fld id="{ADA4F6E2-7C3C-4484-A16E-EF9C7DEC5D55}" type="datetimeFigureOut">
               <a:rPr lang="en-GB" smtClean="0"/>
-              <a:t>07/08/2024</a:t>
+              <a:t>24/10/2024</a:t>
             </a:fld>
             <a:endParaRPr lang="en-GB"/>
           </a:p>
@@ -1142,7 +1147,7 @@
           <a:p>
             <a:fld id="{ADA4F6E2-7C3C-4484-A16E-EF9C7DEC5D55}" type="datetimeFigureOut">
               <a:rPr lang="en-GB" smtClean="0"/>
-              <a:t>07/08/2024</a:t>
+              <a:t>24/10/2024</a:t>
             </a:fld>
             <a:endParaRPr lang="en-GB"/>
           </a:p>
@@ -1410,7 +1415,7 @@
           <a:p>
             <a:fld id="{ADA4F6E2-7C3C-4484-A16E-EF9C7DEC5D55}" type="datetimeFigureOut">
               <a:rPr lang="en-GB" smtClean="0"/>
-              <a:t>07/08/2024</a:t>
+              <a:t>24/10/2024</a:t>
             </a:fld>
             <a:endParaRPr lang="en-GB"/>
           </a:p>
@@ -1825,7 +1830,7 @@
           <a:p>
             <a:fld id="{ADA4F6E2-7C3C-4484-A16E-EF9C7DEC5D55}" type="datetimeFigureOut">
               <a:rPr lang="en-GB" smtClean="0"/>
-              <a:t>07/08/2024</a:t>
+              <a:t>24/10/2024</a:t>
             </a:fld>
             <a:endParaRPr lang="en-GB"/>
           </a:p>
@@ -1967,7 +1972,7 @@
           <a:p>
             <a:fld id="{ADA4F6E2-7C3C-4484-A16E-EF9C7DEC5D55}" type="datetimeFigureOut">
               <a:rPr lang="en-GB" smtClean="0"/>
-              <a:t>07/08/2024</a:t>
+              <a:t>24/10/2024</a:t>
             </a:fld>
             <a:endParaRPr lang="en-GB"/>
           </a:p>
@@ -2080,7 +2085,7 @@
           <a:p>
             <a:fld id="{ADA4F6E2-7C3C-4484-A16E-EF9C7DEC5D55}" type="datetimeFigureOut">
               <a:rPr lang="en-GB" smtClean="0"/>
-              <a:t>07/08/2024</a:t>
+              <a:t>24/10/2024</a:t>
             </a:fld>
             <a:endParaRPr lang="en-GB"/>
           </a:p>
@@ -2393,7 +2398,7 @@
           <a:p>
             <a:fld id="{ADA4F6E2-7C3C-4484-A16E-EF9C7DEC5D55}" type="datetimeFigureOut">
               <a:rPr lang="en-GB" smtClean="0"/>
-              <a:t>07/08/2024</a:t>
+              <a:t>24/10/2024</a:t>
             </a:fld>
             <a:endParaRPr lang="en-GB"/>
           </a:p>
@@ -2682,7 +2687,7 @@
           <a:p>
             <a:fld id="{ADA4F6E2-7C3C-4484-A16E-EF9C7DEC5D55}" type="datetimeFigureOut">
               <a:rPr lang="en-GB" smtClean="0"/>
-              <a:t>07/08/2024</a:t>
+              <a:t>24/10/2024</a:t>
             </a:fld>
             <a:endParaRPr lang="en-GB"/>
           </a:p>
@@ -2925,7 +2930,7 @@
           <a:p>
             <a:fld id="{ADA4F6E2-7C3C-4484-A16E-EF9C7DEC5D55}" type="datetimeFigureOut">
               <a:rPr lang="en-GB" smtClean="0"/>
-              <a:t>07/08/2024</a:t>
+              <a:t>24/10/2024</a:t>
             </a:fld>
             <a:endParaRPr lang="en-GB"/>
           </a:p>
@@ -3331,10 +3336,7 @@
     <p:bg>
       <p:bgPr>
         <a:solidFill>
-          <a:schemeClr val="accent6">
-            <a:lumMod val="20000"/>
-            <a:lumOff val="80000"/>
-          </a:schemeClr>
+          <a:schemeClr val="bg1"/>
         </a:solidFill>
         <a:effectLst/>
       </p:bgPr>
@@ -3367,13 +3369,18 @@
         </p:nvSpPr>
         <p:spPr>
           <a:xfrm>
-            <a:off x="1111045" y="1365721"/>
-            <a:ext cx="2821857" cy="830997"/>
+            <a:off x="688264" y="852812"/>
+            <a:ext cx="2821857" cy="769441"/>
           </a:xfrm>
           <a:prstGeom prst="rect">
             <a:avLst/>
           </a:prstGeom>
-          <a:noFill/>
+          <a:solidFill>
+            <a:schemeClr val="accent6">
+              <a:lumMod val="20000"/>
+              <a:lumOff val="80000"/>
+            </a:schemeClr>
+          </a:solidFill>
         </p:spPr>
         <p:txBody>
           <a:bodyPr wrap="square" rtlCol="0">
@@ -3382,7 +3389,7 @@
           <a:lstStyle/>
           <a:p>
             <a:r>
-              <a:rPr lang="en-GB" sz="2400" b="1" dirty="0"/>
+              <a:rPr lang="en-GB" sz="2200" b="1" dirty="0"/>
               <a:t>What is your current mood?</a:t>
             </a:r>
           </a:p>
@@ -3402,13 +3409,18 @@
         </p:nvSpPr>
         <p:spPr>
           <a:xfrm>
-            <a:off x="4301615" y="1364758"/>
-            <a:ext cx="3097160" cy="830997"/>
+            <a:off x="4181182" y="852812"/>
+            <a:ext cx="3097160" cy="769441"/>
           </a:xfrm>
           <a:prstGeom prst="rect">
             <a:avLst/>
           </a:prstGeom>
-          <a:noFill/>
+          <a:solidFill>
+            <a:schemeClr val="accent6">
+              <a:lumMod val="20000"/>
+              <a:lumOff val="80000"/>
+            </a:schemeClr>
+          </a:solidFill>
         </p:spPr>
         <p:txBody>
           <a:bodyPr wrap="square" rtlCol="0">
@@ -3417,12 +3429,12 @@
           <a:lstStyle/>
           <a:p>
             <a:r>
-              <a:rPr lang="en-GB" sz="2400" b="1" dirty="0"/>
-              <a:t>What </a:t>
-            </a:r>
-            <a:r>
-              <a:rPr lang="en-GB" sz="2400" dirty="0"/>
-              <a:t>are you doing? Your feelings?</a:t>
+              <a:rPr lang="en-GB" sz="2200" b="1" dirty="0"/>
+              <a:t>Activity: What </a:t>
+            </a:r>
+            <a:r>
+              <a:rPr lang="en-GB" sz="2200" dirty="0"/>
+              <a:t>are you doing?</a:t>
             </a:r>
           </a:p>
         </p:txBody>
@@ -3441,13 +3453,18 @@
         </p:nvSpPr>
         <p:spPr>
           <a:xfrm>
-            <a:off x="8146028" y="1364758"/>
-            <a:ext cx="2743200" cy="830997"/>
+            <a:off x="7978887" y="863242"/>
+            <a:ext cx="2743200" cy="769441"/>
           </a:xfrm>
           <a:prstGeom prst="rect">
             <a:avLst/>
           </a:prstGeom>
-          <a:noFill/>
+          <a:solidFill>
+            <a:schemeClr val="accent6">
+              <a:lumMod val="20000"/>
+              <a:lumOff val="80000"/>
+            </a:schemeClr>
+          </a:solidFill>
         </p:spPr>
         <p:txBody>
           <a:bodyPr wrap="square" rtlCol="0">
@@ -3456,12 +3473,12 @@
           <a:lstStyle/>
           <a:p>
             <a:r>
-              <a:rPr lang="en-GB" sz="2400" b="1" dirty="0"/>
-              <a:t>Who </a:t>
-            </a:r>
-            <a:r>
-              <a:rPr lang="en-GB" sz="2400" dirty="0"/>
-              <a:t>are you with? Your feelings?</a:t>
+              <a:rPr lang="en-GB" sz="2200" b="1" dirty="0"/>
+              <a:t>Social company: Who </a:t>
+            </a:r>
+            <a:r>
+              <a:rPr lang="en-GB" sz="2200" dirty="0"/>
+              <a:t>are you with?</a:t>
             </a:r>
           </a:p>
         </p:txBody>
@@ -3480,13 +3497,18 @@
         </p:nvSpPr>
         <p:spPr>
           <a:xfrm>
-            <a:off x="8146028" y="3068677"/>
-            <a:ext cx="3052914" cy="1200329"/>
+            <a:off x="7978887" y="5329434"/>
+            <a:ext cx="2743200" cy="769441"/>
           </a:xfrm>
           <a:prstGeom prst="rect">
             <a:avLst/>
           </a:prstGeom>
-          <a:noFill/>
+          <a:solidFill>
+            <a:schemeClr val="accent6">
+              <a:lumMod val="20000"/>
+              <a:lumOff val="80000"/>
+            </a:schemeClr>
+          </a:solidFill>
         </p:spPr>
         <p:txBody>
           <a:bodyPr wrap="square" rtlCol="0">
@@ -3495,22 +3517,16 @@
           <a:lstStyle/>
           <a:p>
             <a:r>
-              <a:rPr lang="en-GB" sz="2400" b="1" dirty="0"/>
-              <a:t>What </a:t>
-            </a:r>
-            <a:r>
-              <a:rPr lang="en-GB" sz="2400" dirty="0"/>
+              <a:rPr lang="en-GB" sz="2200" b="1" dirty="0"/>
+              <a:t>Activity: What </a:t>
+            </a:r>
+            <a:r>
+              <a:rPr lang="en-GB" sz="2200" dirty="0"/>
               <a:t>are you doing </a:t>
             </a:r>
             <a:r>
-              <a:rPr lang="en-GB" sz="2400" b="1" dirty="0"/>
+              <a:rPr lang="en-GB" sz="2200" b="1" dirty="0"/>
               <a:t>next?</a:t>
-            </a:r>
-          </a:p>
-          <a:p>
-            <a:r>
-              <a:rPr lang="en-GB" sz="2400" dirty="0"/>
-              <a:t>Your feelings?</a:t>
             </a:r>
           </a:p>
         </p:txBody>
@@ -3529,13 +3545,18 @@
         </p:nvSpPr>
         <p:spPr>
           <a:xfrm>
-            <a:off x="8146028" y="4893077"/>
-            <a:ext cx="2743200" cy="1200329"/>
+            <a:off x="4259813" y="5329434"/>
+            <a:ext cx="3097160" cy="769441"/>
           </a:xfrm>
           <a:prstGeom prst="rect">
             <a:avLst/>
           </a:prstGeom>
-          <a:noFill/>
+          <a:solidFill>
+            <a:schemeClr val="accent6">
+              <a:lumMod val="20000"/>
+              <a:lumOff val="80000"/>
+            </a:schemeClr>
+          </a:solidFill>
         </p:spPr>
         <p:txBody>
           <a:bodyPr wrap="square" rtlCol="0">
@@ -3544,24 +3565,18 @@
           <a:lstStyle/>
           <a:p>
             <a:r>
-              <a:rPr lang="en-GB" sz="2400" b="1" dirty="0"/>
-              <a:t>Who </a:t>
-            </a:r>
-            <a:r>
-              <a:rPr lang="en-GB" sz="2400" dirty="0"/>
+              <a:rPr lang="en-GB" sz="2200" b="1" dirty="0"/>
+              <a:t>Social company: Who </a:t>
+            </a:r>
+            <a:r>
+              <a:rPr lang="en-GB" sz="2200" dirty="0"/>
               <a:t>are you with </a:t>
             </a:r>
             <a:r>
-              <a:rPr lang="en-GB" sz="2400" b="1" dirty="0"/>
+              <a:rPr lang="en-GB" sz="2200" b="1" dirty="0"/>
               <a:t>next?</a:t>
             </a:r>
-            <a:endParaRPr lang="en-GB" sz="2400" dirty="0"/>
-          </a:p>
-          <a:p>
-            <a:r>
-              <a:rPr lang="en-GB" sz="2400" dirty="0"/>
-              <a:t>Your feelings?</a:t>
-            </a:r>
+            <a:endParaRPr lang="en-GB" sz="2200" dirty="0"/>
           </a:p>
         </p:txBody>
       </p:sp>
@@ -3579,13 +3594,18 @@
         </p:nvSpPr>
         <p:spPr>
           <a:xfrm>
-            <a:off x="2753032" y="3853507"/>
-            <a:ext cx="2585881" cy="830997"/>
+            <a:off x="1354389" y="3848109"/>
+            <a:ext cx="2585881" cy="769441"/>
           </a:xfrm>
           <a:prstGeom prst="rect">
             <a:avLst/>
           </a:prstGeom>
-          <a:noFill/>
+          <a:solidFill>
+            <a:schemeClr val="accent6">
+              <a:lumMod val="20000"/>
+              <a:lumOff val="80000"/>
+            </a:schemeClr>
+          </a:solidFill>
         </p:spPr>
         <p:txBody>
           <a:bodyPr wrap="square" rtlCol="0">
@@ -3594,11 +3614,11 @@
           <a:lstStyle/>
           <a:p>
             <a:r>
-              <a:rPr lang="en-GB" sz="2400" b="1" dirty="0"/>
+              <a:rPr lang="en-GB" sz="2200" b="1" dirty="0"/>
               <a:t>Gap </a:t>
             </a:r>
             <a:r>
-              <a:rPr lang="en-GB" sz="2400" dirty="0"/>
+              <a:rPr lang="en-GB" sz="2200" dirty="0"/>
               <a:t>between beeps</a:t>
             </a:r>
           </a:p>
@@ -3614,14 +3634,16 @@
             </a:extLst>
           </p:cNvPr>
           <p:cNvCxnSpPr>
+            <a:cxnSpLocks/>
+            <a:stCxn id="4" idx="3"/>
             <a:endCxn id="5" idx="1"/>
           </p:cNvCxnSpPr>
           <p:nvPr/>
         </p:nvCxnSpPr>
         <p:spPr>
           <a:xfrm>
-            <a:off x="3264310" y="1780256"/>
-            <a:ext cx="1037305" cy="1"/>
+            <a:off x="3510121" y="1237533"/>
+            <a:ext cx="671061" cy="0"/>
           </a:xfrm>
           <a:prstGeom prst="straightConnector1">
             <a:avLst/>
@@ -3659,105 +3681,17 @@
               </a:ext>
             </a:extLst>
           </p:cNvPr>
-          <p:cNvCxnSpPr/>
-          <p:nvPr/>
-        </p:nvCxnSpPr>
-        <p:spPr>
-          <a:xfrm>
-            <a:off x="7108723" y="1780256"/>
-            <a:ext cx="1037305" cy="1"/>
-          </a:xfrm>
-          <a:prstGeom prst="straightConnector1">
-            <a:avLst/>
-          </a:prstGeom>
-          <a:ln w="57150">
-            <a:solidFill>
-              <a:schemeClr val="accent4">
-                <a:lumMod val="75000"/>
-              </a:schemeClr>
-            </a:solidFill>
-            <a:tailEnd type="triangle"/>
-          </a:ln>
-        </p:spPr>
-        <p:style>
-          <a:lnRef idx="2">
-            <a:schemeClr val="accent1"/>
-          </a:lnRef>
-          <a:fillRef idx="0">
-            <a:schemeClr val="accent1"/>
-          </a:fillRef>
-          <a:effectRef idx="1">
-            <a:schemeClr val="accent1"/>
-          </a:effectRef>
-          <a:fontRef idx="minor">
-            <a:schemeClr val="tx1"/>
-          </a:fontRef>
-        </p:style>
-      </p:cxnSp>
-      <p:cxnSp>
-        <p:nvCxnSpPr>
-          <p:cNvPr id="18" name="Straight Arrow Connector 17">
-            <a:extLst>
-              <a:ext uri="{FF2B5EF4-FFF2-40B4-BE49-F238E27FC236}">
-                <a16:creationId xmlns:a16="http://schemas.microsoft.com/office/drawing/2014/main" id="{6C5B7FEF-B333-209D-7396-CEC2E6105C79}"/>
-              </a:ext>
-            </a:extLst>
-          </p:cNvPr>
           <p:cNvCxnSpPr>
             <a:cxnSpLocks/>
+            <a:stCxn id="5" idx="3"/>
+            <a:endCxn id="9" idx="1"/>
           </p:cNvCxnSpPr>
           <p:nvPr/>
         </p:nvCxnSpPr>
         <p:spPr>
           <a:xfrm>
-            <a:off x="9360311" y="2195755"/>
-            <a:ext cx="0" cy="872922"/>
-          </a:xfrm>
-          <a:prstGeom prst="straightConnector1">
-            <a:avLst/>
-          </a:prstGeom>
-          <a:ln w="57150">
-            <a:solidFill>
-              <a:schemeClr val="accent4">
-                <a:lumMod val="75000"/>
-              </a:schemeClr>
-            </a:solidFill>
-            <a:tailEnd type="triangle"/>
-          </a:ln>
-        </p:spPr>
-        <p:style>
-          <a:lnRef idx="2">
-            <a:schemeClr val="accent1"/>
-          </a:lnRef>
-          <a:fillRef idx="0">
-            <a:schemeClr val="accent1"/>
-          </a:fillRef>
-          <a:effectRef idx="1">
-            <a:schemeClr val="accent1"/>
-          </a:effectRef>
-          <a:fontRef idx="minor">
-            <a:schemeClr val="tx1"/>
-          </a:fontRef>
-        </p:style>
-      </p:cxnSp>
-      <p:cxnSp>
-        <p:nvCxnSpPr>
-          <p:cNvPr id="23" name="Straight Arrow Connector 22">
-            <a:extLst>
-              <a:ext uri="{FF2B5EF4-FFF2-40B4-BE49-F238E27FC236}">
-                <a16:creationId xmlns:a16="http://schemas.microsoft.com/office/drawing/2014/main" id="{01E2F7F0-3065-3146-B219-CB94B1A69A82}"/>
-              </a:ext>
-            </a:extLst>
-          </p:cNvPr>
-          <p:cNvCxnSpPr>
-            <a:cxnSpLocks/>
-          </p:cNvCxnSpPr>
-          <p:nvPr/>
-        </p:nvCxnSpPr>
-        <p:spPr>
-          <a:xfrm>
-            <a:off x="9370145" y="4269005"/>
-            <a:ext cx="0" cy="624072"/>
+            <a:off x="7278342" y="1237533"/>
+            <a:ext cx="700545" cy="10430"/>
           </a:xfrm>
           <a:prstGeom prst="straightConnector1">
             <a:avLst/>
@@ -3804,8 +3738,8 @@
         </p:nvCxnSpPr>
         <p:spPr>
           <a:xfrm flipH="1" flipV="1">
-            <a:off x="4045973" y="4684504"/>
-            <a:ext cx="4100055" cy="808738"/>
+            <a:off x="2647330" y="4617550"/>
+            <a:ext cx="1612483" cy="1096605"/>
           </a:xfrm>
           <a:prstGeom prst="straightConnector1">
             <a:avLst/>
@@ -3845,14 +3779,15 @@
           </p:cNvPr>
           <p:cNvCxnSpPr>
             <a:cxnSpLocks/>
-            <a:stCxn id="12" idx="1"/>
+            <a:stCxn id="12" idx="0"/>
+            <a:endCxn id="4" idx="2"/>
           </p:cNvCxnSpPr>
           <p:nvPr/>
         </p:nvCxnSpPr>
         <p:spPr>
           <a:xfrm flipH="1" flipV="1">
-            <a:off x="2074606" y="2195755"/>
-            <a:ext cx="678426" cy="2073251"/>
+            <a:off x="2099193" y="1622253"/>
+            <a:ext cx="548137" cy="2225856"/>
           </a:xfrm>
           <a:prstGeom prst="straightConnector1">
             <a:avLst/>
@@ -3863,6 +3798,721 @@
                 <a:lumMod val="75000"/>
               </a:schemeClr>
             </a:solidFill>
+            <a:tailEnd type="triangle"/>
+          </a:ln>
+        </p:spPr>
+        <p:style>
+          <a:lnRef idx="2">
+            <a:schemeClr val="accent1"/>
+          </a:lnRef>
+          <a:fillRef idx="0">
+            <a:schemeClr val="accent1"/>
+          </a:fillRef>
+          <a:effectRef idx="1">
+            <a:schemeClr val="accent1"/>
+          </a:effectRef>
+          <a:fontRef idx="minor">
+            <a:schemeClr val="tx1"/>
+          </a:fontRef>
+        </p:style>
+      </p:cxnSp>
+      <p:sp>
+        <p:nvSpPr>
+          <p:cNvPr id="2" name="TextBox 1">
+            <a:extLst>
+              <a:ext uri="{FF2B5EF4-FFF2-40B4-BE49-F238E27FC236}">
+                <a16:creationId xmlns:a16="http://schemas.microsoft.com/office/drawing/2014/main" id="{4E66A2AF-48E0-6714-0220-3236C4D3AF29}"/>
+              </a:ext>
+            </a:extLst>
+          </p:cNvPr>
+          <p:cNvSpPr txBox="1"/>
+          <p:nvPr/>
+        </p:nvSpPr>
+        <p:spPr>
+          <a:xfrm>
+            <a:off x="5080830" y="1854707"/>
+            <a:ext cx="1897619" cy="430887"/>
+          </a:xfrm>
+          <a:prstGeom prst="rect">
+            <a:avLst/>
+          </a:prstGeom>
+          <a:solidFill>
+            <a:schemeClr val="accent6">
+              <a:lumMod val="20000"/>
+              <a:lumOff val="80000"/>
+            </a:schemeClr>
+          </a:solidFill>
+        </p:spPr>
+        <p:txBody>
+          <a:bodyPr wrap="square" rtlCol="0">
+            <a:spAutoFit/>
+          </a:bodyPr>
+          <a:lstStyle/>
+          <a:p>
+            <a:r>
+              <a:rPr lang="en-GB" sz="2200" dirty="0"/>
+              <a:t>Your feelings?</a:t>
+            </a:r>
+          </a:p>
+        </p:txBody>
+      </p:sp>
+      <p:sp>
+        <p:nvSpPr>
+          <p:cNvPr id="3" name="TextBox 2">
+            <a:extLst>
+              <a:ext uri="{FF2B5EF4-FFF2-40B4-BE49-F238E27FC236}">
+                <a16:creationId xmlns:a16="http://schemas.microsoft.com/office/drawing/2014/main" id="{34EC34ED-E91C-2AFB-0E33-7BF202A844BE}"/>
+              </a:ext>
+            </a:extLst>
+          </p:cNvPr>
+          <p:cNvSpPr txBox="1"/>
+          <p:nvPr/>
+        </p:nvSpPr>
+        <p:spPr>
+          <a:xfrm>
+            <a:off x="5080830" y="2501037"/>
+            <a:ext cx="2276143" cy="1107996"/>
+          </a:xfrm>
+          <a:prstGeom prst="rect">
+            <a:avLst/>
+          </a:prstGeom>
+          <a:solidFill>
+            <a:schemeClr val="accent6">
+              <a:lumMod val="20000"/>
+              <a:lumOff val="80000"/>
+            </a:schemeClr>
+          </a:solidFill>
+        </p:spPr>
+        <p:txBody>
+          <a:bodyPr wrap="square" rtlCol="0">
+            <a:spAutoFit/>
+          </a:bodyPr>
+          <a:lstStyle/>
+          <a:p>
+            <a:r>
+              <a:rPr lang="en-GB" sz="2200" dirty="0"/>
+              <a:t>How </a:t>
+            </a:r>
+            <a:r>
+              <a:rPr lang="en-GB" sz="2200" b="1" dirty="0"/>
+              <a:t>motivated</a:t>
+            </a:r>
+            <a:r>
+              <a:rPr lang="en-GB" sz="2200" dirty="0"/>
+              <a:t> are you for this </a:t>
+            </a:r>
+            <a:r>
+              <a:rPr lang="en-GB" sz="2200" dirty="0">
+                <a:highlight>
+                  <a:srgbClr val="FFFF00"/>
+                </a:highlight>
+              </a:rPr>
+              <a:t>activity</a:t>
+            </a:r>
+            <a:r>
+              <a:rPr lang="en-GB" sz="2200" dirty="0"/>
+              <a:t>?</a:t>
+            </a:r>
+          </a:p>
+        </p:txBody>
+      </p:sp>
+      <p:sp>
+        <p:nvSpPr>
+          <p:cNvPr id="7" name="TextBox 6">
+            <a:extLst>
+              <a:ext uri="{FF2B5EF4-FFF2-40B4-BE49-F238E27FC236}">
+                <a16:creationId xmlns:a16="http://schemas.microsoft.com/office/drawing/2014/main" id="{EAEB69CD-06A0-935B-B225-7146392CBD52}"/>
+              </a:ext>
+            </a:extLst>
+          </p:cNvPr>
+          <p:cNvSpPr txBox="1"/>
+          <p:nvPr/>
+        </p:nvSpPr>
+        <p:spPr>
+          <a:xfrm>
+            <a:off x="8622898" y="2492230"/>
+            <a:ext cx="2212253" cy="1107996"/>
+          </a:xfrm>
+          <a:prstGeom prst="rect">
+            <a:avLst/>
+          </a:prstGeom>
+          <a:solidFill>
+            <a:schemeClr val="accent6">
+              <a:lumMod val="20000"/>
+              <a:lumOff val="80000"/>
+            </a:schemeClr>
+          </a:solidFill>
+        </p:spPr>
+        <p:txBody>
+          <a:bodyPr wrap="square" rtlCol="0">
+            <a:spAutoFit/>
+          </a:bodyPr>
+          <a:lstStyle/>
+          <a:p>
+            <a:r>
+              <a:rPr lang="en-GB" sz="2200" dirty="0"/>
+              <a:t>How </a:t>
+            </a:r>
+            <a:r>
+              <a:rPr lang="en-GB" sz="2200" b="1" dirty="0"/>
+              <a:t>motivated</a:t>
+            </a:r>
+            <a:r>
+              <a:rPr lang="en-GB" sz="2200" dirty="0"/>
+              <a:t> are you for this </a:t>
+            </a:r>
+            <a:r>
+              <a:rPr lang="en-GB" sz="2200" dirty="0">
+                <a:highlight>
+                  <a:srgbClr val="FFFF00"/>
+                </a:highlight>
+              </a:rPr>
+              <a:t>company</a:t>
+            </a:r>
+            <a:r>
+              <a:rPr lang="en-GB" sz="2200" dirty="0"/>
+              <a:t>?</a:t>
+            </a:r>
+          </a:p>
+        </p:txBody>
+      </p:sp>
+      <p:cxnSp>
+        <p:nvCxnSpPr>
+          <p:cNvPr id="61" name="Connector: Elbow 60">
+            <a:extLst>
+              <a:ext uri="{FF2B5EF4-FFF2-40B4-BE49-F238E27FC236}">
+                <a16:creationId xmlns:a16="http://schemas.microsoft.com/office/drawing/2014/main" id="{E5144856-6DBE-83C5-4A00-6FCE868B1C7F}"/>
+              </a:ext>
+            </a:extLst>
+          </p:cNvPr>
+          <p:cNvCxnSpPr>
+            <a:cxnSpLocks/>
+            <a:endCxn id="2" idx="1"/>
+          </p:cNvCxnSpPr>
+          <p:nvPr/>
+        </p:nvCxnSpPr>
+        <p:spPr>
+          <a:xfrm rot="16200000" flipH="1">
+            <a:off x="4661460" y="1650781"/>
+            <a:ext cx="447898" cy="390842"/>
+          </a:xfrm>
+          <a:prstGeom prst="bentConnector2">
+            <a:avLst/>
+          </a:prstGeom>
+          <a:ln w="38100">
+            <a:tailEnd type="triangle"/>
+          </a:ln>
+        </p:spPr>
+        <p:style>
+          <a:lnRef idx="2">
+            <a:schemeClr val="accent1"/>
+          </a:lnRef>
+          <a:fillRef idx="0">
+            <a:schemeClr val="accent1"/>
+          </a:fillRef>
+          <a:effectRef idx="1">
+            <a:schemeClr val="accent1"/>
+          </a:effectRef>
+          <a:fontRef idx="minor">
+            <a:schemeClr val="tx1"/>
+          </a:fontRef>
+        </p:style>
+      </p:cxnSp>
+      <p:cxnSp>
+        <p:nvCxnSpPr>
+          <p:cNvPr id="62" name="Connector: Elbow 61">
+            <a:extLst>
+              <a:ext uri="{FF2B5EF4-FFF2-40B4-BE49-F238E27FC236}">
+                <a16:creationId xmlns:a16="http://schemas.microsoft.com/office/drawing/2014/main" id="{7B7D0EA1-45C9-E5D8-66FC-F15100362968}"/>
+              </a:ext>
+            </a:extLst>
+          </p:cNvPr>
+          <p:cNvCxnSpPr>
+            <a:cxnSpLocks/>
+            <a:endCxn id="3" idx="1"/>
+          </p:cNvCxnSpPr>
+          <p:nvPr/>
+        </p:nvCxnSpPr>
+        <p:spPr>
+          <a:xfrm rot="16200000" flipH="1">
+            <a:off x="4134904" y="2109109"/>
+            <a:ext cx="1422352" cy="469500"/>
+          </a:xfrm>
+          <a:prstGeom prst="bentConnector2">
+            <a:avLst/>
+          </a:prstGeom>
+          <a:ln w="38100">
+            <a:tailEnd type="triangle"/>
+          </a:ln>
+        </p:spPr>
+        <p:style>
+          <a:lnRef idx="2">
+            <a:schemeClr val="accent1"/>
+          </a:lnRef>
+          <a:fillRef idx="0">
+            <a:schemeClr val="accent1"/>
+          </a:fillRef>
+          <a:effectRef idx="1">
+            <a:schemeClr val="accent1"/>
+          </a:effectRef>
+          <a:fontRef idx="minor">
+            <a:schemeClr val="tx1"/>
+          </a:fontRef>
+        </p:style>
+      </p:cxnSp>
+      <p:sp>
+        <p:nvSpPr>
+          <p:cNvPr id="74" name="TextBox 73">
+            <a:extLst>
+              <a:ext uri="{FF2B5EF4-FFF2-40B4-BE49-F238E27FC236}">
+                <a16:creationId xmlns:a16="http://schemas.microsoft.com/office/drawing/2014/main" id="{BEE35CBB-E800-5CFB-3B53-895938DBBBD9}"/>
+              </a:ext>
+            </a:extLst>
+          </p:cNvPr>
+          <p:cNvSpPr txBox="1"/>
+          <p:nvPr/>
+        </p:nvSpPr>
+        <p:spPr>
+          <a:xfrm>
+            <a:off x="8622899" y="1847013"/>
+            <a:ext cx="1897618" cy="430887"/>
+          </a:xfrm>
+          <a:prstGeom prst="rect">
+            <a:avLst/>
+          </a:prstGeom>
+          <a:solidFill>
+            <a:schemeClr val="accent6">
+              <a:lumMod val="20000"/>
+              <a:lumOff val="80000"/>
+            </a:schemeClr>
+          </a:solidFill>
+        </p:spPr>
+        <p:txBody>
+          <a:bodyPr wrap="square" rtlCol="0">
+            <a:spAutoFit/>
+          </a:bodyPr>
+          <a:lstStyle/>
+          <a:p>
+            <a:r>
+              <a:rPr lang="en-GB" sz="2200" dirty="0"/>
+              <a:t>Your feelings?</a:t>
+            </a:r>
+          </a:p>
+        </p:txBody>
+      </p:sp>
+      <p:cxnSp>
+        <p:nvCxnSpPr>
+          <p:cNvPr id="75" name="Connector: Elbow 74">
+            <a:extLst>
+              <a:ext uri="{FF2B5EF4-FFF2-40B4-BE49-F238E27FC236}">
+                <a16:creationId xmlns:a16="http://schemas.microsoft.com/office/drawing/2014/main" id="{EC670004-122F-0C4A-3E33-B56184D7C228}"/>
+              </a:ext>
+            </a:extLst>
+          </p:cNvPr>
+          <p:cNvCxnSpPr>
+            <a:cxnSpLocks/>
+            <a:endCxn id="74" idx="1"/>
+          </p:cNvCxnSpPr>
+          <p:nvPr/>
+        </p:nvCxnSpPr>
+        <p:spPr>
+          <a:xfrm rot="16200000" flipH="1">
+            <a:off x="8203528" y="1643086"/>
+            <a:ext cx="447898" cy="390844"/>
+          </a:xfrm>
+          <a:prstGeom prst="bentConnector2">
+            <a:avLst/>
+          </a:prstGeom>
+          <a:ln w="38100">
+            <a:tailEnd type="triangle"/>
+          </a:ln>
+        </p:spPr>
+        <p:style>
+          <a:lnRef idx="2">
+            <a:schemeClr val="accent1"/>
+          </a:lnRef>
+          <a:fillRef idx="0">
+            <a:schemeClr val="accent1"/>
+          </a:fillRef>
+          <a:effectRef idx="1">
+            <a:schemeClr val="accent1"/>
+          </a:effectRef>
+          <a:fontRef idx="minor">
+            <a:schemeClr val="tx1"/>
+          </a:fontRef>
+        </p:style>
+      </p:cxnSp>
+      <p:cxnSp>
+        <p:nvCxnSpPr>
+          <p:cNvPr id="76" name="Connector: Elbow 75">
+            <a:extLst>
+              <a:ext uri="{FF2B5EF4-FFF2-40B4-BE49-F238E27FC236}">
+                <a16:creationId xmlns:a16="http://schemas.microsoft.com/office/drawing/2014/main" id="{99E7DF92-B13C-87EF-4696-D5824EC10F78}"/>
+              </a:ext>
+            </a:extLst>
+          </p:cNvPr>
+          <p:cNvCxnSpPr>
+            <a:cxnSpLocks/>
+          </p:cNvCxnSpPr>
+          <p:nvPr/>
+        </p:nvCxnSpPr>
+        <p:spPr>
+          <a:xfrm rot="16200000" flipH="1">
+            <a:off x="7772837" y="2082036"/>
+            <a:ext cx="1422352" cy="494076"/>
+          </a:xfrm>
+          <a:prstGeom prst="bentConnector2">
+            <a:avLst/>
+          </a:prstGeom>
+          <a:ln w="38100">
+            <a:tailEnd type="triangle"/>
+          </a:ln>
+        </p:spPr>
+        <p:style>
+          <a:lnRef idx="2">
+            <a:schemeClr val="accent1"/>
+          </a:lnRef>
+          <a:fillRef idx="0">
+            <a:schemeClr val="accent1"/>
+          </a:fillRef>
+          <a:effectRef idx="1">
+            <a:schemeClr val="accent1"/>
+          </a:effectRef>
+          <a:fontRef idx="minor">
+            <a:schemeClr val="tx1"/>
+          </a:fontRef>
+        </p:style>
+      </p:cxnSp>
+      <p:sp>
+        <p:nvSpPr>
+          <p:cNvPr id="83" name="TextBox 82">
+            <a:extLst>
+              <a:ext uri="{FF2B5EF4-FFF2-40B4-BE49-F238E27FC236}">
+                <a16:creationId xmlns:a16="http://schemas.microsoft.com/office/drawing/2014/main" id="{6A930692-0882-1A76-5A3A-CFF733ECD2B1}"/>
+              </a:ext>
+            </a:extLst>
+          </p:cNvPr>
+          <p:cNvSpPr txBox="1"/>
+          <p:nvPr/>
+        </p:nvSpPr>
+        <p:spPr>
+          <a:xfrm>
+            <a:off x="5080830" y="3867195"/>
+            <a:ext cx="2276143" cy="1107996"/>
+          </a:xfrm>
+          <a:prstGeom prst="rect">
+            <a:avLst/>
+          </a:prstGeom>
+          <a:solidFill>
+            <a:schemeClr val="accent6">
+              <a:lumMod val="20000"/>
+              <a:lumOff val="80000"/>
+            </a:schemeClr>
+          </a:solidFill>
+        </p:spPr>
+        <p:txBody>
+          <a:bodyPr wrap="square" rtlCol="0">
+            <a:spAutoFit/>
+          </a:bodyPr>
+          <a:lstStyle/>
+          <a:p>
+            <a:r>
+              <a:rPr lang="en-GB" sz="2200" dirty="0"/>
+              <a:t>How </a:t>
+            </a:r>
+            <a:r>
+              <a:rPr lang="en-GB" sz="2200" b="1" dirty="0"/>
+              <a:t>interested</a:t>
+            </a:r>
+            <a:r>
+              <a:rPr lang="en-GB" sz="2200" dirty="0"/>
+              <a:t> are you in this </a:t>
+            </a:r>
+            <a:r>
+              <a:rPr lang="en-GB" sz="2200" dirty="0">
+                <a:highlight>
+                  <a:srgbClr val="FFFF00"/>
+                </a:highlight>
+              </a:rPr>
+              <a:t>activity</a:t>
+            </a:r>
+            <a:r>
+              <a:rPr lang="en-GB" sz="2200" dirty="0"/>
+              <a:t>?</a:t>
+            </a:r>
+          </a:p>
+        </p:txBody>
+      </p:sp>
+      <p:sp>
+        <p:nvSpPr>
+          <p:cNvPr id="84" name="TextBox 83">
+            <a:extLst>
+              <a:ext uri="{FF2B5EF4-FFF2-40B4-BE49-F238E27FC236}">
+                <a16:creationId xmlns:a16="http://schemas.microsoft.com/office/drawing/2014/main" id="{F4238B54-5CE2-32A4-D766-EF4FF393E52A}"/>
+              </a:ext>
+            </a:extLst>
+          </p:cNvPr>
+          <p:cNvSpPr txBox="1"/>
+          <p:nvPr/>
+        </p:nvSpPr>
+        <p:spPr>
+          <a:xfrm>
+            <a:off x="8622898" y="3867195"/>
+            <a:ext cx="2212253" cy="1107996"/>
+          </a:xfrm>
+          <a:prstGeom prst="rect">
+            <a:avLst/>
+          </a:prstGeom>
+          <a:solidFill>
+            <a:schemeClr val="accent6">
+              <a:lumMod val="20000"/>
+              <a:lumOff val="80000"/>
+            </a:schemeClr>
+          </a:solidFill>
+        </p:spPr>
+        <p:txBody>
+          <a:bodyPr wrap="square" rtlCol="0">
+            <a:spAutoFit/>
+          </a:bodyPr>
+          <a:lstStyle/>
+          <a:p>
+            <a:r>
+              <a:rPr lang="en-GB" sz="2200" dirty="0"/>
+              <a:t>How </a:t>
+            </a:r>
+            <a:r>
+              <a:rPr lang="en-GB" sz="2200" b="1" dirty="0"/>
+              <a:t>interested</a:t>
+            </a:r>
+            <a:r>
+              <a:rPr lang="en-GB" sz="2200" dirty="0"/>
+              <a:t> are you in this </a:t>
+            </a:r>
+            <a:r>
+              <a:rPr lang="en-GB" sz="2200" dirty="0">
+                <a:highlight>
+                  <a:srgbClr val="FFFF00"/>
+                </a:highlight>
+              </a:rPr>
+              <a:t>company</a:t>
+            </a:r>
+            <a:r>
+              <a:rPr lang="en-GB" sz="2200" dirty="0"/>
+              <a:t>?</a:t>
+            </a:r>
+          </a:p>
+        </p:txBody>
+      </p:sp>
+      <p:cxnSp>
+        <p:nvCxnSpPr>
+          <p:cNvPr id="88" name="Straight Arrow Connector 87">
+            <a:extLst>
+              <a:ext uri="{FF2B5EF4-FFF2-40B4-BE49-F238E27FC236}">
+                <a16:creationId xmlns:a16="http://schemas.microsoft.com/office/drawing/2014/main" id="{14E3867C-2A4D-88BB-7F91-9AAAB41EF0A2}"/>
+              </a:ext>
+            </a:extLst>
+          </p:cNvPr>
+          <p:cNvCxnSpPr>
+            <a:cxnSpLocks/>
+            <a:stCxn id="10" idx="1"/>
+            <a:endCxn id="11" idx="3"/>
+          </p:cNvCxnSpPr>
+          <p:nvPr/>
+        </p:nvCxnSpPr>
+        <p:spPr>
+          <a:xfrm flipH="1">
+            <a:off x="7356973" y="5714155"/>
+            <a:ext cx="621914" cy="0"/>
+          </a:xfrm>
+          <a:prstGeom prst="straightConnector1">
+            <a:avLst/>
+          </a:prstGeom>
+          <a:ln w="57150">
+            <a:solidFill>
+              <a:schemeClr val="accent4">
+                <a:lumMod val="75000"/>
+              </a:schemeClr>
+            </a:solidFill>
+            <a:tailEnd type="triangle"/>
+          </a:ln>
+        </p:spPr>
+        <p:style>
+          <a:lnRef idx="2">
+            <a:schemeClr val="accent1"/>
+          </a:lnRef>
+          <a:fillRef idx="0">
+            <a:schemeClr val="accent1"/>
+          </a:fillRef>
+          <a:effectRef idx="1">
+            <a:schemeClr val="accent1"/>
+          </a:effectRef>
+          <a:fontRef idx="minor">
+            <a:schemeClr val="tx1"/>
+          </a:fontRef>
+        </p:style>
+      </p:cxnSp>
+      <p:cxnSp>
+        <p:nvCxnSpPr>
+          <p:cNvPr id="93" name="Connector: Elbow 92">
+            <a:extLst>
+              <a:ext uri="{FF2B5EF4-FFF2-40B4-BE49-F238E27FC236}">
+                <a16:creationId xmlns:a16="http://schemas.microsoft.com/office/drawing/2014/main" id="{55A94F37-6C02-D7D1-C9AA-DCB4DF19E6CE}"/>
+              </a:ext>
+            </a:extLst>
+          </p:cNvPr>
+          <p:cNvCxnSpPr>
+            <a:cxnSpLocks/>
+            <a:stCxn id="84" idx="3"/>
+            <a:endCxn id="10" idx="3"/>
+          </p:cNvCxnSpPr>
+          <p:nvPr/>
+        </p:nvCxnSpPr>
+        <p:spPr>
+          <a:xfrm flipH="1">
+            <a:off x="10722087" y="4421193"/>
+            <a:ext cx="113064" cy="1292962"/>
+          </a:xfrm>
+          <a:prstGeom prst="bentConnector3">
+            <a:avLst>
+              <a:gd name="adj1" fmla="val -123921"/>
+            </a:avLst>
+          </a:prstGeom>
+          <a:ln w="38100">
+            <a:tailEnd type="triangle"/>
+          </a:ln>
+        </p:spPr>
+        <p:style>
+          <a:lnRef idx="2">
+            <a:schemeClr val="accent1"/>
+          </a:lnRef>
+          <a:fillRef idx="0">
+            <a:schemeClr val="accent1"/>
+          </a:fillRef>
+          <a:effectRef idx="1">
+            <a:schemeClr val="accent1"/>
+          </a:effectRef>
+          <a:fontRef idx="minor">
+            <a:schemeClr val="tx1"/>
+          </a:fontRef>
+        </p:style>
+      </p:cxnSp>
+      <p:cxnSp>
+        <p:nvCxnSpPr>
+          <p:cNvPr id="96" name="Connector: Elbow 95">
+            <a:extLst>
+              <a:ext uri="{FF2B5EF4-FFF2-40B4-BE49-F238E27FC236}">
+                <a16:creationId xmlns:a16="http://schemas.microsoft.com/office/drawing/2014/main" id="{4E31904F-7237-8923-EB22-72EA763C827B}"/>
+              </a:ext>
+            </a:extLst>
+          </p:cNvPr>
+          <p:cNvCxnSpPr>
+            <a:cxnSpLocks/>
+            <a:stCxn id="74" idx="3"/>
+            <a:endCxn id="10" idx="3"/>
+          </p:cNvCxnSpPr>
+          <p:nvPr/>
+        </p:nvCxnSpPr>
+        <p:spPr>
+          <a:xfrm>
+            <a:off x="10520517" y="2062457"/>
+            <a:ext cx="201570" cy="3651698"/>
+          </a:xfrm>
+          <a:prstGeom prst="bentConnector3">
+            <a:avLst>
+              <a:gd name="adj1" fmla="val 291456"/>
+            </a:avLst>
+          </a:prstGeom>
+          <a:ln w="38100">
+            <a:tailEnd type="triangle"/>
+          </a:ln>
+        </p:spPr>
+        <p:style>
+          <a:lnRef idx="2">
+            <a:schemeClr val="accent1"/>
+          </a:lnRef>
+          <a:fillRef idx="0">
+            <a:schemeClr val="accent1"/>
+          </a:fillRef>
+          <a:effectRef idx="1">
+            <a:schemeClr val="accent1"/>
+          </a:effectRef>
+          <a:fontRef idx="minor">
+            <a:schemeClr val="tx1"/>
+          </a:fontRef>
+        </p:style>
+      </p:cxnSp>
+      <p:cxnSp>
+        <p:nvCxnSpPr>
+          <p:cNvPr id="104" name="Connector: Elbow 103">
+            <a:extLst>
+              <a:ext uri="{FF2B5EF4-FFF2-40B4-BE49-F238E27FC236}">
+                <a16:creationId xmlns:a16="http://schemas.microsoft.com/office/drawing/2014/main" id="{F3986BBF-BB24-CAE0-92D3-1DCCF7E34A9F}"/>
+              </a:ext>
+            </a:extLst>
+          </p:cNvPr>
+          <p:cNvCxnSpPr>
+            <a:cxnSpLocks/>
+            <a:stCxn id="2" idx="3"/>
+            <a:endCxn id="11" idx="3"/>
+          </p:cNvCxnSpPr>
+          <p:nvPr/>
+        </p:nvCxnSpPr>
+        <p:spPr>
+          <a:xfrm>
+            <a:off x="6978449" y="2070151"/>
+            <a:ext cx="378524" cy="3644004"/>
+          </a:xfrm>
+          <a:prstGeom prst="bentConnector3">
+            <a:avLst>
+              <a:gd name="adj1" fmla="val 160392"/>
+            </a:avLst>
+          </a:prstGeom>
+          <a:ln w="38100">
+            <a:tailEnd type="triangle"/>
+          </a:ln>
+        </p:spPr>
+        <p:style>
+          <a:lnRef idx="2">
+            <a:schemeClr val="accent1"/>
+          </a:lnRef>
+          <a:fillRef idx="0">
+            <a:schemeClr val="accent1"/>
+          </a:fillRef>
+          <a:effectRef idx="1">
+            <a:schemeClr val="accent1"/>
+          </a:effectRef>
+          <a:fontRef idx="minor">
+            <a:schemeClr val="tx1"/>
+          </a:fontRef>
+        </p:style>
+      </p:cxnSp>
+      <p:cxnSp>
+        <p:nvCxnSpPr>
+          <p:cNvPr id="107" name="Connector: Elbow 106">
+            <a:extLst>
+              <a:ext uri="{FF2B5EF4-FFF2-40B4-BE49-F238E27FC236}">
+                <a16:creationId xmlns:a16="http://schemas.microsoft.com/office/drawing/2014/main" id="{A550C83D-BB96-1C8F-55AF-8A04E2E3C40A}"/>
+              </a:ext>
+            </a:extLst>
+          </p:cNvPr>
+          <p:cNvCxnSpPr>
+            <a:cxnSpLocks/>
+            <a:stCxn id="83" idx="3"/>
+            <a:endCxn id="11" idx="3"/>
+          </p:cNvCxnSpPr>
+          <p:nvPr/>
+        </p:nvCxnSpPr>
+        <p:spPr>
+          <a:xfrm>
+            <a:off x="7356973" y="4421193"/>
+            <a:ext cx="12700" cy="1292962"/>
+          </a:xfrm>
+          <a:prstGeom prst="bentConnector3">
+            <a:avLst>
+              <a:gd name="adj1" fmla="val 870969"/>
+            </a:avLst>
+          </a:prstGeom>
+          <a:ln w="38100">
             <a:tailEnd type="triangle"/>
           </a:ln>
         </p:spPr>

</xml_diff>